<commit_message>
fix category in api /product
</commit_message>
<xml_diff>
--- a/baocaodoan.pptx
+++ b/baocaodoan.pptx
@@ -111,6 +111,11 @@
       </a:defRPr>
     </a:lvl9pPr>
   </p:defaultTextStyle>
+  <p:extLst>
+    <p:ext uri="{EFAFB233-063F-42B5-8137-9DF3F51BA10A}">
+      <p15:sldGuideLst xmlns:p15="http://schemas.microsoft.com/office/powerpoint/2012/main"/>
+    </p:ext>
+  </p:extLst>
 </p:presentation>
 </file>
 
@@ -13654,7 +13659,23 @@
                   <a:schemeClr val="tx1"/>
                 </a:solidFill>
               </a:rPr>
-              <a:t>Bad: agility, deploy, performance, </a:t>
+              <a:t>Bad: agility, deploy, </a:t>
+            </a:r>
+            <a:r>
+              <a:rPr lang="en-US" dirty="0" smtClean="0">
+                <a:solidFill>
+                  <a:schemeClr val="tx1"/>
+                </a:solidFill>
+              </a:rPr>
+              <a:t>performance</a:t>
+            </a:r>
+            <a:r>
+              <a:rPr lang="en-US" dirty="0" smtClean="0">
+                <a:solidFill>
+                  <a:schemeClr val="tx1"/>
+                </a:solidFill>
+              </a:rPr>
+              <a:t>, </a:t>
             </a:r>
             <a:r>
               <a:rPr lang="en-US" dirty="0" err="1" smtClean="0">
@@ -13663,6 +13684,21 @@
                 </a:solidFill>
               </a:rPr>
               <a:t>scalablity</a:t>
+            </a:r>
+            <a:endParaRPr lang="en-US" dirty="0" smtClean="0">
+              <a:solidFill>
+                <a:schemeClr val="tx1"/>
+              </a:solidFill>
+            </a:endParaRPr>
+          </a:p>
+          <a:p>
+            <a:r>
+              <a:rPr lang="en-US" dirty="0" smtClean="0">
+                <a:solidFill>
+                  <a:schemeClr val="tx1"/>
+                </a:solidFill>
+              </a:rPr>
+              <a:t>Natural choice.</a:t>
             </a:r>
             <a:endParaRPr lang="vi-VN" dirty="0">
               <a:solidFill>
@@ -14157,15 +14193,7 @@
                   <a:srgbClr val="00B050"/>
                 </a:solidFill>
               </a:rPr>
-              <a:t>back</a:t>
-            </a:r>
-            <a:r>
-              <a:rPr lang="en-GB" b="1" dirty="0" smtClean="0">
-                <a:solidFill>
-                  <a:srgbClr val="00B050"/>
-                </a:solidFill>
-              </a:rPr>
-              <a:t>-end</a:t>
+              <a:t>back-end</a:t>
             </a:r>
             <a:endParaRPr lang="vi-VN" b="1" dirty="0" smtClean="0">
               <a:solidFill>
@@ -14715,25 +14743,8 @@
                   </a:schemeClr>
                 </a:solidFill>
               </a:rPr>
-              <a:t>Login, register, bình luận, đánh giá sản phẩm, </a:t>
-            </a:r>
-            <a:r>
-              <a:rPr lang="en-US" b="1" dirty="0" smtClean="0">
-                <a:solidFill>
-                  <a:schemeClr val="accent5">
-                    <a:lumMod val="75000"/>
-                  </a:schemeClr>
-                </a:solidFill>
-              </a:rPr>
-              <a:t>chức năng cart</a:t>
-            </a:r>
-            <a:endParaRPr lang="en-US" b="1" dirty="0" smtClean="0">
-              <a:solidFill>
-                <a:schemeClr val="accent5">
-                  <a:lumMod val="75000"/>
-                </a:schemeClr>
-              </a:solidFill>
-            </a:endParaRPr>
+              <a:t>Login, register, bình luận, đánh giá sản phẩm, chức năng cart</a:t>
+            </a:r>
           </a:p>
           <a:p>
             <a:pPr marL="342900" indent="-342900">

</xml_diff>